<commit_message>
porocilo .docx, predstavitev .pptx
</commit_message>
<xml_diff>
--- a/PR2023-24_vmesna_ATJSBDKJNK.pptx
+++ b/PR2023-24_vmesna_ATJSBDKJNK.pptx
@@ -5,15 +5,16 @@
     <p:sldMasterId id="2147483660" r:id="rId1"/>
   </p:sldMasterIdLst>
   <p:notesMasterIdLst>
-    <p:notesMasterId r:id="rId5"/>
+    <p:notesMasterId r:id="rId6"/>
   </p:notesMasterIdLst>
   <p:handoutMasterIdLst>
-    <p:handoutMasterId r:id="rId6"/>
+    <p:handoutMasterId r:id="rId7"/>
   </p:handoutMasterIdLst>
   <p:sldIdLst>
     <p:sldId id="256" r:id="rId2"/>
     <p:sldId id="258" r:id="rId3"/>
-    <p:sldId id="259" r:id="rId4"/>
+    <p:sldId id="260" r:id="rId4"/>
+    <p:sldId id="259" r:id="rId5"/>
   </p:sldIdLst>
   <p:sldSz cx="9144000" cy="5143500" type="screen16x9"/>
   <p:notesSz cx="6858000" cy="9144000"/>
@@ -733,6 +734,90 @@
     <p:extLst>
       <p:ext uri="{BB962C8B-B14F-4D97-AF65-F5344CB8AC3E}">
         <p14:creationId xmlns:p14="http://schemas.microsoft.com/office/powerpoint/2010/main" val="1539589135"/>
+      </p:ext>
+    </p:extLst>
+  </p:cSld>
+  <p:clrMapOvr>
+    <a:masterClrMapping/>
+  </p:clrMapOvr>
+</p:notes>
+</file>
+
+<file path=ppt/notesSlides/notesSlide2.xml><?xml version="1.0" encoding="utf-8"?>
+<p:notes xmlns:a="http://schemas.openxmlformats.org/drawingml/2006/main" xmlns:r="http://schemas.openxmlformats.org/officeDocument/2006/relationships" xmlns:p="http://schemas.openxmlformats.org/presentationml/2006/main">
+  <p:cSld>
+    <p:spTree>
+      <p:nvGrpSpPr>
+        <p:cNvPr id="1" name=""/>
+        <p:cNvGrpSpPr/>
+        <p:nvPr/>
+      </p:nvGrpSpPr>
+      <p:grpSpPr>
+        <a:xfrm>
+          <a:off x="0" y="0"/>
+          <a:ext cx="0" cy="0"/>
+          <a:chOff x="0" y="0"/>
+          <a:chExt cx="0" cy="0"/>
+        </a:xfrm>
+      </p:grpSpPr>
+      <p:sp>
+        <p:nvSpPr>
+          <p:cNvPr id="2" name="Označba mesta stranske slike 1"/>
+          <p:cNvSpPr>
+            <a:spLocks noGrp="1" noRot="1" noChangeAspect="1"/>
+          </p:cNvSpPr>
+          <p:nvPr>
+            <p:ph type="sldImg"/>
+          </p:nvPr>
+        </p:nvSpPr>
+        <p:spPr/>
+      </p:sp>
+      <p:sp>
+        <p:nvSpPr>
+          <p:cNvPr id="3" name="Označba mesta opomb 2"/>
+          <p:cNvSpPr>
+            <a:spLocks noGrp="1"/>
+          </p:cNvSpPr>
+          <p:nvPr>
+            <p:ph type="body" idx="1"/>
+          </p:nvPr>
+        </p:nvSpPr>
+        <p:spPr/>
+        <p:txBody>
+          <a:bodyPr/>
+          <a:lstStyle/>
+          <a:p>
+            <a:endParaRPr lang="sl-SI" dirty="0"/>
+          </a:p>
+        </p:txBody>
+      </p:sp>
+      <p:sp>
+        <p:nvSpPr>
+          <p:cNvPr id="4" name="Označba mesta številke diapozitiva 3"/>
+          <p:cNvSpPr>
+            <a:spLocks noGrp="1"/>
+          </p:cNvSpPr>
+          <p:nvPr>
+            <p:ph type="sldNum" sz="quarter" idx="5"/>
+          </p:nvPr>
+        </p:nvSpPr>
+        <p:spPr/>
+        <p:txBody>
+          <a:bodyPr/>
+          <a:lstStyle/>
+          <a:p>
+            <a:fld id="{B3847C52-DF7F-F947-B704-F0BAD17B1E31}" type="slidenum">
+              <a:rPr lang="en-US" smtClean="0"/>
+              <a:t>3</a:t>
+            </a:fld>
+            <a:endParaRPr lang="en-US"/>
+          </a:p>
+        </p:txBody>
+      </p:sp>
+    </p:spTree>
+    <p:extLst>
+      <p:ext uri="{BB962C8B-B14F-4D97-AF65-F5344CB8AC3E}">
+        <p14:creationId xmlns:p14="http://schemas.microsoft.com/office/powerpoint/2010/main" val="1304942944"/>
       </p:ext>
     </p:extLst>
   </p:cSld>
@@ -4380,7 +4465,7 @@
         <p:spPr>
           <a:xfrm>
             <a:off x="92765" y="589356"/>
-            <a:ext cx="4403432" cy="4485088"/>
+            <a:ext cx="4403432" cy="4177907"/>
           </a:xfrm>
           <a:ln>
             <a:solidFill>
@@ -4390,7 +4475,7 @@
         </p:spPr>
         <p:txBody>
           <a:bodyPr>
-            <a:normAutofit lnSpcReduction="10000"/>
+            <a:normAutofit/>
           </a:bodyPr>
           <a:lstStyle/>
           <a:p>
@@ -4413,6 +4498,18 @@
             </a:r>
           </a:p>
           <a:p>
+            <a:endParaRPr lang="sl-SI" sz="1600" dirty="0"/>
+          </a:p>
+          <a:p>
+            <a:endParaRPr lang="sl-SI" sz="1600" dirty="0"/>
+          </a:p>
+          <a:p>
+            <a:endParaRPr lang="sl-SI" sz="1600" dirty="0"/>
+          </a:p>
+          <a:p>
+            <a:endParaRPr lang="sl-SI" sz="1600" dirty="0"/>
+          </a:p>
+          <a:p>
             <a:pPr marL="0" indent="0">
               <a:buNone/>
             </a:pPr>
@@ -4430,79 +4527,6 @@
               <a:rPr lang="sl-SI" sz="1600" dirty="0"/>
               <a:t>Prešteli smo nesreče za posamezen model in narisali graf za top 10</a:t>
             </a:r>
-          </a:p>
-          <a:p>
-            <a:pPr marL="0" indent="0">
-              <a:buNone/>
-            </a:pPr>
-            <a:r>
-              <a:rPr lang="sl-SI" sz="1600" b="1" dirty="0"/>
-              <a:t>Cilj3: </a:t>
-            </a:r>
-            <a:r>
-              <a:rPr lang="sl-SI" sz="1600" dirty="0"/>
-              <a:t>Katera so najbolj/najmanj uspešna letalska podjetja glede na število mrtvih, število potnikov in število letov?</a:t>
-            </a:r>
-          </a:p>
-          <a:p>
-            <a:r>
-              <a:rPr lang="sl-SI" sz="1600" dirty="0"/>
-              <a:t>Šli smo čez vsa podjetja, seštevali št. mrtvih, potnikov, letov. Podatke smo normalizirali in narisali graf</a:t>
-            </a:r>
-          </a:p>
-          <a:p>
-            <a:pPr marL="0" indent="0">
-              <a:buNone/>
-            </a:pPr>
-            <a:r>
-              <a:rPr lang="sl-SI" sz="1600" b="1" dirty="0"/>
-              <a:t>Cilj4: </a:t>
-            </a:r>
-            <a:r>
-              <a:rPr lang="sl-SI" sz="1600" dirty="0"/>
-              <a:t>letalske nesreče na zemljevidu sveta</a:t>
-            </a:r>
-            <a:endParaRPr lang="en-US" sz="1600" dirty="0"/>
-          </a:p>
-          <a:p>
-            <a:r>
-              <a:rPr lang="sl-SI" sz="1600" dirty="0" err="1"/>
-              <a:t>reverse</a:t>
-            </a:r>
-            <a:r>
-              <a:rPr lang="sl-SI" sz="1600" dirty="0"/>
-              <a:t> </a:t>
-            </a:r>
-            <a:r>
-              <a:rPr lang="sl-SI" sz="1600" dirty="0" err="1"/>
-              <a:t>geocoding</a:t>
-            </a:r>
-            <a:r>
-              <a:rPr lang="sl-SI" sz="1600" dirty="0"/>
-              <a:t> za pridobitev koordinat (nov </a:t>
-            </a:r>
-            <a:r>
-              <a:rPr lang="sl-SI" sz="1600" dirty="0" err="1"/>
-              <a:t>csv</a:t>
-            </a:r>
-            <a:r>
-              <a:rPr lang="sl-SI" sz="1600" dirty="0"/>
-              <a:t>), prikaz nesreč na zemljevidu s </a:t>
-            </a:r>
-            <a:r>
-              <a:rPr lang="sl-SI" sz="1600" dirty="0" err="1"/>
-              <a:t>cartopy</a:t>
-            </a:r>
-            <a:r>
-              <a:rPr lang="sl-SI" sz="1600" dirty="0"/>
-              <a:t> knjižnico</a:t>
-            </a:r>
-          </a:p>
-          <a:p>
-            <a:pPr marL="0" indent="0">
-              <a:buNone/>
-            </a:pPr>
-            <a:endParaRPr lang="sl-SI" sz="1600" dirty="0"/>
           </a:p>
           <a:p>
             <a:pPr marL="0" indent="0">
@@ -4541,10 +4565,33 @@
         </p:spPr>
         <p:txBody>
           <a:bodyPr>
-            <a:normAutofit lnSpcReduction="10000"/>
+            <a:normAutofit/>
           </a:bodyPr>
           <a:lstStyle/>
           <a:p>
+            <a:r>
+              <a:rPr lang="sl-SI" sz="1600" dirty="0"/>
+              <a:t>Na začetku manj nesreč (manj razvita letalska industrija, manj letal), velik porast v 2. svetovni vojni, 1972 največ nesreč (velika rast industrije, manj zanesljiva tehnologija), od 2008 naprej manj nesreč (naprednejša tehnologija (boljši motorji, sistemi za nadzor letenja), strožje regulative (redni pregledi in certificiranje letal in operaterjev)</a:t>
+            </a:r>
+          </a:p>
+          <a:p>
+            <a:endParaRPr lang="sl-SI" sz="1600" dirty="0"/>
+          </a:p>
+          <a:p>
+            <a:pPr marL="0" indent="0">
+              <a:buNone/>
+            </a:pPr>
+            <a:endParaRPr lang="sl-SI" sz="1600" dirty="0"/>
+          </a:p>
+          <a:p>
+            <a:r>
+              <a:rPr lang="sl-SI" sz="1600" dirty="0" err="1"/>
+              <a:t>Douglass</a:t>
+            </a:r>
+            <a:r>
+              <a:rPr lang="sl-SI" sz="1600" dirty="0"/>
+              <a:t> DC-3 (potniško letalo): s 334 nesrečami daleč najbolj pogosto vpleten v nesreče – dolga operativna dobe (več desetletij). Danes je operativnih 150 letal.</a:t>
+            </a:r>
             <a:endParaRPr lang="en-US" sz="1600" dirty="0"/>
           </a:p>
         </p:txBody>
@@ -5356,6 +5403,1079 @@
       </p:grpSpPr>
       <p:sp>
         <p:nvSpPr>
+          <p:cNvPr id="3" name="Content Placeholder 2">
+            <a:extLst>
+              <a:ext uri="{FF2B5EF4-FFF2-40B4-BE49-F238E27FC236}">
+                <a16:creationId xmlns:a16="http://schemas.microsoft.com/office/drawing/2014/main" id="{9D9094EB-9AF8-C443-A38F-2140C80C75A0}"/>
+              </a:ext>
+            </a:extLst>
+          </p:cNvPr>
+          <p:cNvSpPr>
+            <a:spLocks noGrp="1"/>
+          </p:cNvSpPr>
+          <p:nvPr>
+            <p:ph sz="half" idx="1"/>
+          </p:nvPr>
+        </p:nvSpPr>
+        <p:spPr>
+          <a:xfrm>
+            <a:off x="92765" y="589356"/>
+            <a:ext cx="4403432" cy="4177907"/>
+          </a:xfrm>
+          <a:ln>
+            <a:solidFill>
+              <a:schemeClr val="tx1"/>
+            </a:solidFill>
+          </a:ln>
+        </p:spPr>
+        <p:txBody>
+          <a:bodyPr>
+            <a:normAutofit/>
+          </a:bodyPr>
+          <a:lstStyle/>
+          <a:p>
+            <a:pPr marL="0" indent="0">
+              <a:buNone/>
+            </a:pPr>
+            <a:r>
+              <a:rPr lang="sl-SI" sz="1600" b="1" dirty="0"/>
+              <a:t>Cilj3: </a:t>
+            </a:r>
+            <a:r>
+              <a:rPr lang="sl-SI" sz="1600" dirty="0"/>
+              <a:t>Katera so najmanj uspešna letalska podjetja glede na število mrtvih, število potnikov in število letov?</a:t>
+            </a:r>
+          </a:p>
+          <a:p>
+            <a:r>
+              <a:rPr lang="sl-SI" sz="1600" dirty="0"/>
+              <a:t>Šli smo čez vsa podjetja, seštevali št. mrtvih, potnikov, letov. Podatke smo normalizirali in narisali graf</a:t>
+            </a:r>
+          </a:p>
+          <a:p>
+            <a:endParaRPr lang="sl-SI" sz="1600" dirty="0"/>
+          </a:p>
+          <a:p>
+            <a:endParaRPr lang="sl-SI" sz="1600" dirty="0"/>
+          </a:p>
+          <a:p>
+            <a:pPr marL="0" indent="0">
+              <a:buNone/>
+            </a:pPr>
+            <a:r>
+              <a:rPr lang="sl-SI" sz="1600" b="1" dirty="0"/>
+              <a:t>Cilj4: </a:t>
+            </a:r>
+            <a:r>
+              <a:rPr lang="sl-SI" sz="1600" dirty="0"/>
+              <a:t>letalske nesreče na zemljevidu sveta</a:t>
+            </a:r>
+            <a:endParaRPr lang="en-US" sz="1600" dirty="0"/>
+          </a:p>
+          <a:p>
+            <a:r>
+              <a:rPr lang="sl-SI" sz="1600" dirty="0" err="1"/>
+              <a:t>reverse</a:t>
+            </a:r>
+            <a:r>
+              <a:rPr lang="sl-SI" sz="1600" dirty="0"/>
+              <a:t> </a:t>
+            </a:r>
+            <a:r>
+              <a:rPr lang="sl-SI" sz="1600" dirty="0" err="1"/>
+              <a:t>geocoding</a:t>
+            </a:r>
+            <a:r>
+              <a:rPr lang="sl-SI" sz="1600" dirty="0"/>
+              <a:t> za pridobitev koordinat (nov </a:t>
+            </a:r>
+            <a:r>
+              <a:rPr lang="sl-SI" sz="1600" dirty="0" err="1"/>
+              <a:t>csv</a:t>
+            </a:r>
+            <a:r>
+              <a:rPr lang="sl-SI" sz="1600" dirty="0"/>
+              <a:t>), prikaz nesreč na zemljevidu s </a:t>
+            </a:r>
+            <a:r>
+              <a:rPr lang="sl-SI" sz="1600" dirty="0" err="1"/>
+              <a:t>cartopy</a:t>
+            </a:r>
+            <a:r>
+              <a:rPr lang="sl-SI" sz="1600" dirty="0"/>
+              <a:t> knjižnico</a:t>
+            </a:r>
+          </a:p>
+          <a:p>
+            <a:pPr marL="0" indent="0">
+              <a:buNone/>
+            </a:pPr>
+            <a:endParaRPr lang="sl-SI" sz="1600" dirty="0"/>
+          </a:p>
+          <a:p>
+            <a:pPr marL="0" indent="0">
+              <a:buNone/>
+            </a:pPr>
+            <a:endParaRPr lang="sl-SI" sz="1600" b="1" dirty="0"/>
+          </a:p>
+        </p:txBody>
+      </p:sp>
+      <p:sp>
+        <p:nvSpPr>
+          <p:cNvPr id="18" name="Content Placeholder 17">
+            <a:extLst>
+              <a:ext uri="{FF2B5EF4-FFF2-40B4-BE49-F238E27FC236}">
+                <a16:creationId xmlns:a16="http://schemas.microsoft.com/office/drawing/2014/main" id="{BFC9798E-C22A-6049-8D8E-80BEDDEA70AA}"/>
+              </a:ext>
+            </a:extLst>
+          </p:cNvPr>
+          <p:cNvSpPr>
+            <a:spLocks noGrp="1"/>
+          </p:cNvSpPr>
+          <p:nvPr>
+            <p:ph sz="half" idx="2"/>
+          </p:nvPr>
+        </p:nvSpPr>
+        <p:spPr>
+          <a:xfrm>
+            <a:off x="4588962" y="589356"/>
+            <a:ext cx="4462272" cy="4177907"/>
+          </a:xfrm>
+          <a:ln>
+            <a:solidFill>
+              <a:schemeClr val="tx1"/>
+            </a:solidFill>
+          </a:ln>
+        </p:spPr>
+        <p:txBody>
+          <a:bodyPr>
+            <a:normAutofit/>
+          </a:bodyPr>
+          <a:lstStyle/>
+          <a:p>
+            <a:endParaRPr lang="sl-SI" sz="1600" dirty="0"/>
+          </a:p>
+          <a:p>
+            <a:r>
+              <a:rPr lang="sl-SI" sz="1600" dirty="0"/>
+              <a:t>Težava: definicija „uspešnost“</a:t>
+            </a:r>
+          </a:p>
+          <a:p>
+            <a:endParaRPr lang="sl-SI" sz="1600" dirty="0"/>
+          </a:p>
+          <a:p>
+            <a:endParaRPr lang="sl-SI" sz="1600" dirty="0"/>
+          </a:p>
+          <a:p>
+            <a:endParaRPr lang="sl-SI" sz="1600" dirty="0"/>
+          </a:p>
+          <a:p>
+            <a:endParaRPr lang="sl-SI" sz="1600" dirty="0"/>
+          </a:p>
+          <a:p>
+            <a:endParaRPr lang="sl-SI" sz="1600" dirty="0"/>
+          </a:p>
+          <a:p>
+            <a:r>
+              <a:rPr lang="sl-SI" sz="1600" dirty="0"/>
+              <a:t>N</a:t>
+            </a:r>
+            <a:r>
+              <a:rPr lang="en-US" sz="1600" dirty="0" err="1"/>
+              <a:t>ajveč</a:t>
+            </a:r>
+            <a:r>
+              <a:rPr lang="en-US" sz="1600" dirty="0"/>
+              <a:t> </a:t>
+            </a:r>
+            <a:r>
+              <a:rPr lang="en-US" sz="1600" dirty="0" err="1"/>
+              <a:t>nesreč</a:t>
+            </a:r>
+            <a:r>
+              <a:rPr lang="en-US" sz="1600" dirty="0"/>
+              <a:t> </a:t>
+            </a:r>
+            <a:r>
+              <a:rPr lang="en-US" sz="1600" dirty="0" err="1"/>
+              <a:t>na</a:t>
+            </a:r>
+            <a:r>
+              <a:rPr lang="en-US" sz="1600" dirty="0"/>
+              <a:t> </a:t>
+            </a:r>
+            <a:r>
+              <a:rPr lang="en-US" sz="1600" dirty="0" err="1"/>
+              <a:t>vzhodu</a:t>
+            </a:r>
+            <a:r>
+              <a:rPr lang="en-US" sz="1600" dirty="0"/>
+              <a:t> ZDA in </a:t>
+            </a:r>
+            <a:r>
+              <a:rPr lang="en-US" sz="1600" dirty="0" err="1"/>
+              <a:t>zahodu</a:t>
+            </a:r>
+            <a:r>
+              <a:rPr lang="en-US" sz="1600" dirty="0"/>
+              <a:t> </a:t>
+            </a:r>
+            <a:r>
+              <a:rPr lang="en-US" sz="1600" dirty="0" err="1"/>
+              <a:t>Evrope</a:t>
+            </a:r>
+            <a:r>
+              <a:rPr lang="en-US" sz="1600" dirty="0"/>
+              <a:t>, </a:t>
+            </a:r>
+            <a:r>
+              <a:rPr lang="en-US" sz="1600" dirty="0" err="1"/>
+              <a:t>kjer</a:t>
+            </a:r>
+            <a:r>
+              <a:rPr lang="en-US" sz="1600" dirty="0"/>
+              <a:t> so </a:t>
+            </a:r>
+            <a:r>
+              <a:rPr lang="en-US" sz="1600" dirty="0" err="1"/>
+              <a:t>najbolj</a:t>
+            </a:r>
+            <a:r>
+              <a:rPr lang="en-US" sz="1600" dirty="0"/>
+              <a:t> </a:t>
+            </a:r>
+            <a:r>
+              <a:rPr lang="en-US" sz="1600" dirty="0" err="1"/>
+              <a:t>prometne</a:t>
+            </a:r>
+            <a:r>
+              <a:rPr lang="en-US" sz="1600" dirty="0"/>
+              <a:t> </a:t>
+            </a:r>
+            <a:r>
+              <a:rPr lang="en-US" sz="1600" dirty="0" err="1"/>
+              <a:t>letalske</a:t>
+            </a:r>
+            <a:r>
+              <a:rPr lang="en-US" sz="1600" dirty="0"/>
+              <a:t> </a:t>
+            </a:r>
+            <a:r>
+              <a:rPr lang="en-US" sz="1600" dirty="0" err="1"/>
+              <a:t>poti</a:t>
+            </a:r>
+            <a:endParaRPr lang="en-US" sz="1600" dirty="0"/>
+          </a:p>
+        </p:txBody>
+      </p:sp>
+      <p:sp>
+        <p:nvSpPr>
+          <p:cNvPr id="7" name="Slide Number Placeholder 6">
+            <a:extLst>
+              <a:ext uri="{FF2B5EF4-FFF2-40B4-BE49-F238E27FC236}">
+                <a16:creationId xmlns:a16="http://schemas.microsoft.com/office/drawing/2014/main" id="{C24814E3-8963-334D-848C-E4EE0D7A5ECE}"/>
+              </a:ext>
+            </a:extLst>
+          </p:cNvPr>
+          <p:cNvSpPr>
+            <a:spLocks noGrp="1"/>
+          </p:cNvSpPr>
+          <p:nvPr>
+            <p:ph type="sldNum" sz="quarter" idx="12"/>
+          </p:nvPr>
+        </p:nvSpPr>
+        <p:spPr/>
+        <p:txBody>
+          <a:bodyPr/>
+          <a:lstStyle/>
+          <a:p>
+            <a:fld id="{03BC8BC1-971C-5C4D-898D-87CE7EF1EB36}" type="slidenum">
+              <a:rPr lang="en-US" smtClean="0"/>
+              <a:t>3</a:t>
+            </a:fld>
+            <a:endParaRPr lang="en-US"/>
+          </a:p>
+        </p:txBody>
+      </p:sp>
+      <p:sp>
+        <p:nvSpPr>
+          <p:cNvPr id="8" name="Content Placeholder 2">
+            <a:extLst>
+              <a:ext uri="{FF2B5EF4-FFF2-40B4-BE49-F238E27FC236}">
+                <a16:creationId xmlns:a16="http://schemas.microsoft.com/office/drawing/2014/main" id="{194343F5-9AFD-314A-B851-B4B16EF4AB6C}"/>
+              </a:ext>
+            </a:extLst>
+          </p:cNvPr>
+          <p:cNvSpPr txBox="1">
+            <a:spLocks/>
+          </p:cNvSpPr>
+          <p:nvPr/>
+        </p:nvSpPr>
+        <p:spPr>
+          <a:xfrm>
+            <a:off x="92765" y="82696"/>
+            <a:ext cx="4403432" cy="372120"/>
+          </a:xfrm>
+          <a:prstGeom prst="rect">
+            <a:avLst/>
+          </a:prstGeom>
+          <a:ln>
+            <a:noFill/>
+          </a:ln>
+        </p:spPr>
+        <p:txBody>
+          <a:bodyPr vert="horz" lIns="91440" tIns="45720" rIns="91440" bIns="45720" rtlCol="0">
+            <a:normAutofit/>
+          </a:bodyPr>
+          <a:lstStyle>
+            <a:lvl1pPr marL="171450" indent="-171450" algn="l" defTabSz="685800" rtl="0" eaLnBrk="1" latinLnBrk="0" hangingPunct="1">
+              <a:lnSpc>
+                <a:spcPct val="90000"/>
+              </a:lnSpc>
+              <a:spcBef>
+                <a:spcPts val="750"/>
+              </a:spcBef>
+              <a:buFont typeface="Arial" panose="020B0604020202020204" pitchFamily="34" charset="0"/>
+              <a:buChar char="•"/>
+              <a:defRPr sz="2100" kern="1200">
+                <a:solidFill>
+                  <a:schemeClr val="tx1"/>
+                </a:solidFill>
+                <a:latin typeface="+mn-lt"/>
+                <a:ea typeface="+mn-ea"/>
+                <a:cs typeface="+mn-cs"/>
+              </a:defRPr>
+            </a:lvl1pPr>
+            <a:lvl2pPr marL="514350" indent="-171450" algn="l" defTabSz="685800" rtl="0" eaLnBrk="1" latinLnBrk="0" hangingPunct="1">
+              <a:lnSpc>
+                <a:spcPct val="90000"/>
+              </a:lnSpc>
+              <a:spcBef>
+                <a:spcPts val="375"/>
+              </a:spcBef>
+              <a:buFont typeface="Arial" panose="020B0604020202020204" pitchFamily="34" charset="0"/>
+              <a:buChar char="•"/>
+              <a:defRPr sz="1800" kern="1200">
+                <a:solidFill>
+                  <a:schemeClr val="tx1"/>
+                </a:solidFill>
+                <a:latin typeface="+mn-lt"/>
+                <a:ea typeface="+mn-ea"/>
+                <a:cs typeface="+mn-cs"/>
+              </a:defRPr>
+            </a:lvl2pPr>
+            <a:lvl3pPr marL="857250" indent="-171450" algn="l" defTabSz="685800" rtl="0" eaLnBrk="1" latinLnBrk="0" hangingPunct="1">
+              <a:lnSpc>
+                <a:spcPct val="90000"/>
+              </a:lnSpc>
+              <a:spcBef>
+                <a:spcPts val="375"/>
+              </a:spcBef>
+              <a:buFont typeface="Arial" panose="020B0604020202020204" pitchFamily="34" charset="0"/>
+              <a:buChar char="•"/>
+              <a:defRPr sz="1500" kern="1200">
+                <a:solidFill>
+                  <a:schemeClr val="tx1"/>
+                </a:solidFill>
+                <a:latin typeface="+mn-lt"/>
+                <a:ea typeface="+mn-ea"/>
+                <a:cs typeface="+mn-cs"/>
+              </a:defRPr>
+            </a:lvl3pPr>
+            <a:lvl4pPr marL="1200150" indent="-171450" algn="l" defTabSz="685800" rtl="0" eaLnBrk="1" latinLnBrk="0" hangingPunct="1">
+              <a:lnSpc>
+                <a:spcPct val="90000"/>
+              </a:lnSpc>
+              <a:spcBef>
+                <a:spcPts val="375"/>
+              </a:spcBef>
+              <a:buFont typeface="Arial" panose="020B0604020202020204" pitchFamily="34" charset="0"/>
+              <a:buChar char="•"/>
+              <a:defRPr sz="1350" kern="1200">
+                <a:solidFill>
+                  <a:schemeClr val="tx1"/>
+                </a:solidFill>
+                <a:latin typeface="+mn-lt"/>
+                <a:ea typeface="+mn-ea"/>
+                <a:cs typeface="+mn-cs"/>
+              </a:defRPr>
+            </a:lvl4pPr>
+            <a:lvl5pPr marL="1543050" indent="-171450" algn="l" defTabSz="685800" rtl="0" eaLnBrk="1" latinLnBrk="0" hangingPunct="1">
+              <a:lnSpc>
+                <a:spcPct val="90000"/>
+              </a:lnSpc>
+              <a:spcBef>
+                <a:spcPts val="375"/>
+              </a:spcBef>
+              <a:buFont typeface="Arial" panose="020B0604020202020204" pitchFamily="34" charset="0"/>
+              <a:buChar char="•"/>
+              <a:defRPr sz="1350" kern="1200">
+                <a:solidFill>
+                  <a:schemeClr val="tx1"/>
+                </a:solidFill>
+                <a:latin typeface="+mn-lt"/>
+                <a:ea typeface="+mn-ea"/>
+                <a:cs typeface="+mn-cs"/>
+              </a:defRPr>
+            </a:lvl5pPr>
+            <a:lvl6pPr marL="1885950" indent="-171450" algn="l" defTabSz="685800" rtl="0" eaLnBrk="1" latinLnBrk="0" hangingPunct="1">
+              <a:lnSpc>
+                <a:spcPct val="90000"/>
+              </a:lnSpc>
+              <a:spcBef>
+                <a:spcPts val="375"/>
+              </a:spcBef>
+              <a:buFont typeface="Arial" panose="020B0604020202020204" pitchFamily="34" charset="0"/>
+              <a:buChar char="•"/>
+              <a:defRPr sz="1350" kern="1200">
+                <a:solidFill>
+                  <a:schemeClr val="tx1"/>
+                </a:solidFill>
+                <a:latin typeface="+mn-lt"/>
+                <a:ea typeface="+mn-ea"/>
+                <a:cs typeface="+mn-cs"/>
+              </a:defRPr>
+            </a:lvl6pPr>
+            <a:lvl7pPr marL="2228850" indent="-171450" algn="l" defTabSz="685800" rtl="0" eaLnBrk="1" latinLnBrk="0" hangingPunct="1">
+              <a:lnSpc>
+                <a:spcPct val="90000"/>
+              </a:lnSpc>
+              <a:spcBef>
+                <a:spcPts val="375"/>
+              </a:spcBef>
+              <a:buFont typeface="Arial" panose="020B0604020202020204" pitchFamily="34" charset="0"/>
+              <a:buChar char="•"/>
+              <a:defRPr sz="1350" kern="1200">
+                <a:solidFill>
+                  <a:schemeClr val="tx1"/>
+                </a:solidFill>
+                <a:latin typeface="+mn-lt"/>
+                <a:ea typeface="+mn-ea"/>
+                <a:cs typeface="+mn-cs"/>
+              </a:defRPr>
+            </a:lvl7pPr>
+            <a:lvl8pPr marL="2571750" indent="-171450" algn="l" defTabSz="685800" rtl="0" eaLnBrk="1" latinLnBrk="0" hangingPunct="1">
+              <a:lnSpc>
+                <a:spcPct val="90000"/>
+              </a:lnSpc>
+              <a:spcBef>
+                <a:spcPts val="375"/>
+              </a:spcBef>
+              <a:buFont typeface="Arial" panose="020B0604020202020204" pitchFamily="34" charset="0"/>
+              <a:buChar char="•"/>
+              <a:defRPr sz="1350" kern="1200">
+                <a:solidFill>
+                  <a:schemeClr val="tx1"/>
+                </a:solidFill>
+                <a:latin typeface="+mn-lt"/>
+                <a:ea typeface="+mn-ea"/>
+                <a:cs typeface="+mn-cs"/>
+              </a:defRPr>
+            </a:lvl8pPr>
+            <a:lvl9pPr marL="2914650" indent="-171450" algn="l" defTabSz="685800" rtl="0" eaLnBrk="1" latinLnBrk="0" hangingPunct="1">
+              <a:lnSpc>
+                <a:spcPct val="90000"/>
+              </a:lnSpc>
+              <a:spcBef>
+                <a:spcPts val="375"/>
+              </a:spcBef>
+              <a:buFont typeface="Arial" panose="020B0604020202020204" pitchFamily="34" charset="0"/>
+              <a:buChar char="•"/>
+              <a:defRPr sz="1350" kern="1200">
+                <a:solidFill>
+                  <a:schemeClr val="tx1"/>
+                </a:solidFill>
+                <a:latin typeface="+mn-lt"/>
+                <a:ea typeface="+mn-ea"/>
+                <a:cs typeface="+mn-cs"/>
+              </a:defRPr>
+            </a:lvl9pPr>
+          </a:lstStyle>
+          <a:p>
+            <a:pPr marL="0" indent="0">
+              <a:buNone/>
+            </a:pPr>
+            <a:r>
+              <a:rPr lang="en-US" sz="1600" b="1" dirty="0" err="1"/>
+              <a:t>Podroben</a:t>
+            </a:r>
+            <a:r>
+              <a:rPr lang="en-US" sz="1600" b="1" dirty="0"/>
+              <a:t> </a:t>
+            </a:r>
+            <a:r>
+              <a:rPr lang="en-US" sz="1600" b="1" dirty="0" err="1"/>
+              <a:t>opis</a:t>
+            </a:r>
+            <a:r>
+              <a:rPr lang="en-US" sz="1600" b="1" dirty="0"/>
+              <a:t> </a:t>
+            </a:r>
+            <a:r>
+              <a:rPr lang="en-US" sz="1600" b="1" dirty="0" err="1"/>
+              <a:t>ciljev</a:t>
+            </a:r>
+            <a:r>
+              <a:rPr lang="en-US" sz="1600" b="1" dirty="0"/>
+              <a:t> in </a:t>
+            </a:r>
+            <a:r>
+              <a:rPr lang="en-US" sz="1600" b="1" dirty="0" err="1"/>
+              <a:t>metod</a:t>
+            </a:r>
+            <a:endParaRPr lang="en-US" sz="1600" b="1" dirty="0"/>
+          </a:p>
+        </p:txBody>
+      </p:sp>
+      <p:sp>
+        <p:nvSpPr>
+          <p:cNvPr id="11" name="Content Placeholder 11">
+            <a:extLst>
+              <a:ext uri="{FF2B5EF4-FFF2-40B4-BE49-F238E27FC236}">
+                <a16:creationId xmlns:a16="http://schemas.microsoft.com/office/drawing/2014/main" id="{7B9F5A0B-66B3-574B-8ADF-47E9BEA982E5}"/>
+              </a:ext>
+            </a:extLst>
+          </p:cNvPr>
+          <p:cNvSpPr txBox="1">
+            <a:spLocks/>
+          </p:cNvSpPr>
+          <p:nvPr/>
+        </p:nvSpPr>
+        <p:spPr>
+          <a:xfrm>
+            <a:off x="4572000" y="720327"/>
+            <a:ext cx="4436828" cy="3040640"/>
+          </a:xfrm>
+          <a:prstGeom prst="rect">
+            <a:avLst/>
+          </a:prstGeom>
+        </p:spPr>
+        <p:txBody>
+          <a:bodyPr/>
+          <a:lstStyle>
+            <a:lvl1pPr marL="171450" indent="-171450" algn="l" defTabSz="685800" rtl="0" eaLnBrk="1" latinLnBrk="0" hangingPunct="1">
+              <a:lnSpc>
+                <a:spcPct val="90000"/>
+              </a:lnSpc>
+              <a:spcBef>
+                <a:spcPts val="750"/>
+              </a:spcBef>
+              <a:buFont typeface="Arial" panose="020B0604020202020204" pitchFamily="34" charset="0"/>
+              <a:buChar char="•"/>
+              <a:defRPr sz="2100" kern="1200">
+                <a:solidFill>
+                  <a:schemeClr val="tx1"/>
+                </a:solidFill>
+                <a:latin typeface="+mn-lt"/>
+                <a:ea typeface="+mn-ea"/>
+                <a:cs typeface="+mn-cs"/>
+              </a:defRPr>
+            </a:lvl1pPr>
+            <a:lvl2pPr marL="514350" indent="-171450" algn="l" defTabSz="685800" rtl="0" eaLnBrk="1" latinLnBrk="0" hangingPunct="1">
+              <a:lnSpc>
+                <a:spcPct val="90000"/>
+              </a:lnSpc>
+              <a:spcBef>
+                <a:spcPts val="375"/>
+              </a:spcBef>
+              <a:buFont typeface="Arial" panose="020B0604020202020204" pitchFamily="34" charset="0"/>
+              <a:buChar char="•"/>
+              <a:defRPr sz="1800" kern="1200">
+                <a:solidFill>
+                  <a:schemeClr val="tx1"/>
+                </a:solidFill>
+                <a:latin typeface="+mn-lt"/>
+                <a:ea typeface="+mn-ea"/>
+                <a:cs typeface="+mn-cs"/>
+              </a:defRPr>
+            </a:lvl2pPr>
+            <a:lvl3pPr marL="857250" indent="-171450" algn="l" defTabSz="685800" rtl="0" eaLnBrk="1" latinLnBrk="0" hangingPunct="1">
+              <a:lnSpc>
+                <a:spcPct val="90000"/>
+              </a:lnSpc>
+              <a:spcBef>
+                <a:spcPts val="375"/>
+              </a:spcBef>
+              <a:buFont typeface="Arial" panose="020B0604020202020204" pitchFamily="34" charset="0"/>
+              <a:buChar char="•"/>
+              <a:defRPr sz="1500" kern="1200">
+                <a:solidFill>
+                  <a:schemeClr val="tx1"/>
+                </a:solidFill>
+                <a:latin typeface="+mn-lt"/>
+                <a:ea typeface="+mn-ea"/>
+                <a:cs typeface="+mn-cs"/>
+              </a:defRPr>
+            </a:lvl3pPr>
+            <a:lvl4pPr marL="1200150" indent="-171450" algn="l" defTabSz="685800" rtl="0" eaLnBrk="1" latinLnBrk="0" hangingPunct="1">
+              <a:lnSpc>
+                <a:spcPct val="90000"/>
+              </a:lnSpc>
+              <a:spcBef>
+                <a:spcPts val="375"/>
+              </a:spcBef>
+              <a:buFont typeface="Arial" panose="020B0604020202020204" pitchFamily="34" charset="0"/>
+              <a:buChar char="•"/>
+              <a:defRPr sz="1350" kern="1200">
+                <a:solidFill>
+                  <a:schemeClr val="tx1"/>
+                </a:solidFill>
+                <a:latin typeface="+mn-lt"/>
+                <a:ea typeface="+mn-ea"/>
+                <a:cs typeface="+mn-cs"/>
+              </a:defRPr>
+            </a:lvl4pPr>
+            <a:lvl5pPr marL="1543050" indent="-171450" algn="l" defTabSz="685800" rtl="0" eaLnBrk="1" latinLnBrk="0" hangingPunct="1">
+              <a:lnSpc>
+                <a:spcPct val="90000"/>
+              </a:lnSpc>
+              <a:spcBef>
+                <a:spcPts val="375"/>
+              </a:spcBef>
+              <a:buFont typeface="Arial" panose="020B0604020202020204" pitchFamily="34" charset="0"/>
+              <a:buChar char="•"/>
+              <a:defRPr sz="1350" kern="1200">
+                <a:solidFill>
+                  <a:schemeClr val="tx1"/>
+                </a:solidFill>
+                <a:latin typeface="+mn-lt"/>
+                <a:ea typeface="+mn-ea"/>
+                <a:cs typeface="+mn-cs"/>
+              </a:defRPr>
+            </a:lvl5pPr>
+            <a:lvl6pPr marL="1885950" indent="-171450" algn="l" defTabSz="685800" rtl="0" eaLnBrk="1" latinLnBrk="0" hangingPunct="1">
+              <a:lnSpc>
+                <a:spcPct val="90000"/>
+              </a:lnSpc>
+              <a:spcBef>
+                <a:spcPts val="375"/>
+              </a:spcBef>
+              <a:buFont typeface="Arial" panose="020B0604020202020204" pitchFamily="34" charset="0"/>
+              <a:buChar char="•"/>
+              <a:defRPr sz="1350" kern="1200">
+                <a:solidFill>
+                  <a:schemeClr val="tx1"/>
+                </a:solidFill>
+                <a:latin typeface="+mn-lt"/>
+                <a:ea typeface="+mn-ea"/>
+                <a:cs typeface="+mn-cs"/>
+              </a:defRPr>
+            </a:lvl6pPr>
+            <a:lvl7pPr marL="2228850" indent="-171450" algn="l" defTabSz="685800" rtl="0" eaLnBrk="1" latinLnBrk="0" hangingPunct="1">
+              <a:lnSpc>
+                <a:spcPct val="90000"/>
+              </a:lnSpc>
+              <a:spcBef>
+                <a:spcPts val="375"/>
+              </a:spcBef>
+              <a:buFont typeface="Arial" panose="020B0604020202020204" pitchFamily="34" charset="0"/>
+              <a:buChar char="•"/>
+              <a:defRPr sz="1350" kern="1200">
+                <a:solidFill>
+                  <a:schemeClr val="tx1"/>
+                </a:solidFill>
+                <a:latin typeface="+mn-lt"/>
+                <a:ea typeface="+mn-ea"/>
+                <a:cs typeface="+mn-cs"/>
+              </a:defRPr>
+            </a:lvl7pPr>
+            <a:lvl8pPr marL="2571750" indent="-171450" algn="l" defTabSz="685800" rtl="0" eaLnBrk="1" latinLnBrk="0" hangingPunct="1">
+              <a:lnSpc>
+                <a:spcPct val="90000"/>
+              </a:lnSpc>
+              <a:spcBef>
+                <a:spcPts val="375"/>
+              </a:spcBef>
+              <a:buFont typeface="Arial" panose="020B0604020202020204" pitchFamily="34" charset="0"/>
+              <a:buChar char="•"/>
+              <a:defRPr sz="1350" kern="1200">
+                <a:solidFill>
+                  <a:schemeClr val="tx1"/>
+                </a:solidFill>
+                <a:latin typeface="+mn-lt"/>
+                <a:ea typeface="+mn-ea"/>
+                <a:cs typeface="+mn-cs"/>
+              </a:defRPr>
+            </a:lvl8pPr>
+            <a:lvl9pPr marL="2914650" indent="-171450" algn="l" defTabSz="685800" rtl="0" eaLnBrk="1" latinLnBrk="0" hangingPunct="1">
+              <a:lnSpc>
+                <a:spcPct val="90000"/>
+              </a:lnSpc>
+              <a:spcBef>
+                <a:spcPts val="375"/>
+              </a:spcBef>
+              <a:buFont typeface="Arial" panose="020B0604020202020204" pitchFamily="34" charset="0"/>
+              <a:buChar char="•"/>
+              <a:defRPr sz="1350" kern="1200">
+                <a:solidFill>
+                  <a:schemeClr val="tx1"/>
+                </a:solidFill>
+                <a:latin typeface="+mn-lt"/>
+                <a:ea typeface="+mn-ea"/>
+                <a:cs typeface="+mn-cs"/>
+              </a:defRPr>
+            </a:lvl9pPr>
+          </a:lstStyle>
+          <a:p>
+            <a:pPr marL="0" indent="0">
+              <a:buFont typeface="Arial" panose="020B0604020202020204" pitchFamily="34" charset="0"/>
+              <a:buNone/>
+            </a:pPr>
+            <a:endParaRPr lang="en-US" sz="1600" dirty="0"/>
+          </a:p>
+        </p:txBody>
+      </p:sp>
+      <p:sp>
+        <p:nvSpPr>
+          <p:cNvPr id="19" name="Content Placeholder 2">
+            <a:extLst>
+              <a:ext uri="{FF2B5EF4-FFF2-40B4-BE49-F238E27FC236}">
+                <a16:creationId xmlns:a16="http://schemas.microsoft.com/office/drawing/2014/main" id="{990225E6-F674-D74E-9E6E-25DF3C6A53B1}"/>
+              </a:ext>
+            </a:extLst>
+          </p:cNvPr>
+          <p:cNvSpPr txBox="1">
+            <a:spLocks/>
+          </p:cNvSpPr>
+          <p:nvPr/>
+        </p:nvSpPr>
+        <p:spPr>
+          <a:xfrm>
+            <a:off x="4588962" y="82696"/>
+            <a:ext cx="4462272" cy="372120"/>
+          </a:xfrm>
+          <a:prstGeom prst="rect">
+            <a:avLst/>
+          </a:prstGeom>
+          <a:ln>
+            <a:noFill/>
+          </a:ln>
+        </p:spPr>
+        <p:txBody>
+          <a:bodyPr vert="horz" lIns="91440" tIns="45720" rIns="91440" bIns="45720" rtlCol="0">
+            <a:normAutofit/>
+          </a:bodyPr>
+          <a:lstStyle>
+            <a:lvl1pPr marL="171450" indent="-171450" algn="l" defTabSz="685800" rtl="0" eaLnBrk="1" latinLnBrk="0" hangingPunct="1">
+              <a:lnSpc>
+                <a:spcPct val="90000"/>
+              </a:lnSpc>
+              <a:spcBef>
+                <a:spcPts val="750"/>
+              </a:spcBef>
+              <a:buFont typeface="Arial" panose="020B0604020202020204" pitchFamily="34" charset="0"/>
+              <a:buChar char="•"/>
+              <a:defRPr sz="2100" kern="1200">
+                <a:solidFill>
+                  <a:schemeClr val="tx1"/>
+                </a:solidFill>
+                <a:latin typeface="+mn-lt"/>
+                <a:ea typeface="+mn-ea"/>
+                <a:cs typeface="+mn-cs"/>
+              </a:defRPr>
+            </a:lvl1pPr>
+            <a:lvl2pPr marL="514350" indent="-171450" algn="l" defTabSz="685800" rtl="0" eaLnBrk="1" latinLnBrk="0" hangingPunct="1">
+              <a:lnSpc>
+                <a:spcPct val="90000"/>
+              </a:lnSpc>
+              <a:spcBef>
+                <a:spcPts val="375"/>
+              </a:spcBef>
+              <a:buFont typeface="Arial" panose="020B0604020202020204" pitchFamily="34" charset="0"/>
+              <a:buChar char="•"/>
+              <a:defRPr sz="1800" kern="1200">
+                <a:solidFill>
+                  <a:schemeClr val="tx1"/>
+                </a:solidFill>
+                <a:latin typeface="+mn-lt"/>
+                <a:ea typeface="+mn-ea"/>
+                <a:cs typeface="+mn-cs"/>
+              </a:defRPr>
+            </a:lvl2pPr>
+            <a:lvl3pPr marL="857250" indent="-171450" algn="l" defTabSz="685800" rtl="0" eaLnBrk="1" latinLnBrk="0" hangingPunct="1">
+              <a:lnSpc>
+                <a:spcPct val="90000"/>
+              </a:lnSpc>
+              <a:spcBef>
+                <a:spcPts val="375"/>
+              </a:spcBef>
+              <a:buFont typeface="Arial" panose="020B0604020202020204" pitchFamily="34" charset="0"/>
+              <a:buChar char="•"/>
+              <a:defRPr sz="1500" kern="1200">
+                <a:solidFill>
+                  <a:schemeClr val="tx1"/>
+                </a:solidFill>
+                <a:latin typeface="+mn-lt"/>
+                <a:ea typeface="+mn-ea"/>
+                <a:cs typeface="+mn-cs"/>
+              </a:defRPr>
+            </a:lvl3pPr>
+            <a:lvl4pPr marL="1200150" indent="-171450" algn="l" defTabSz="685800" rtl="0" eaLnBrk="1" latinLnBrk="0" hangingPunct="1">
+              <a:lnSpc>
+                <a:spcPct val="90000"/>
+              </a:lnSpc>
+              <a:spcBef>
+                <a:spcPts val="375"/>
+              </a:spcBef>
+              <a:buFont typeface="Arial" panose="020B0604020202020204" pitchFamily="34" charset="0"/>
+              <a:buChar char="•"/>
+              <a:defRPr sz="1350" kern="1200">
+                <a:solidFill>
+                  <a:schemeClr val="tx1"/>
+                </a:solidFill>
+                <a:latin typeface="+mn-lt"/>
+                <a:ea typeface="+mn-ea"/>
+                <a:cs typeface="+mn-cs"/>
+              </a:defRPr>
+            </a:lvl4pPr>
+            <a:lvl5pPr marL="1543050" indent="-171450" algn="l" defTabSz="685800" rtl="0" eaLnBrk="1" latinLnBrk="0" hangingPunct="1">
+              <a:lnSpc>
+                <a:spcPct val="90000"/>
+              </a:lnSpc>
+              <a:spcBef>
+                <a:spcPts val="375"/>
+              </a:spcBef>
+              <a:buFont typeface="Arial" panose="020B0604020202020204" pitchFamily="34" charset="0"/>
+              <a:buChar char="•"/>
+              <a:defRPr sz="1350" kern="1200">
+                <a:solidFill>
+                  <a:schemeClr val="tx1"/>
+                </a:solidFill>
+                <a:latin typeface="+mn-lt"/>
+                <a:ea typeface="+mn-ea"/>
+                <a:cs typeface="+mn-cs"/>
+              </a:defRPr>
+            </a:lvl5pPr>
+            <a:lvl6pPr marL="1885950" indent="-171450" algn="l" defTabSz="685800" rtl="0" eaLnBrk="1" latinLnBrk="0" hangingPunct="1">
+              <a:lnSpc>
+                <a:spcPct val="90000"/>
+              </a:lnSpc>
+              <a:spcBef>
+                <a:spcPts val="375"/>
+              </a:spcBef>
+              <a:buFont typeface="Arial" panose="020B0604020202020204" pitchFamily="34" charset="0"/>
+              <a:buChar char="•"/>
+              <a:defRPr sz="1350" kern="1200">
+                <a:solidFill>
+                  <a:schemeClr val="tx1"/>
+                </a:solidFill>
+                <a:latin typeface="+mn-lt"/>
+                <a:ea typeface="+mn-ea"/>
+                <a:cs typeface="+mn-cs"/>
+              </a:defRPr>
+            </a:lvl6pPr>
+            <a:lvl7pPr marL="2228850" indent="-171450" algn="l" defTabSz="685800" rtl="0" eaLnBrk="1" latinLnBrk="0" hangingPunct="1">
+              <a:lnSpc>
+                <a:spcPct val="90000"/>
+              </a:lnSpc>
+              <a:spcBef>
+                <a:spcPts val="375"/>
+              </a:spcBef>
+              <a:buFont typeface="Arial" panose="020B0604020202020204" pitchFamily="34" charset="0"/>
+              <a:buChar char="•"/>
+              <a:defRPr sz="1350" kern="1200">
+                <a:solidFill>
+                  <a:schemeClr val="tx1"/>
+                </a:solidFill>
+                <a:latin typeface="+mn-lt"/>
+                <a:ea typeface="+mn-ea"/>
+                <a:cs typeface="+mn-cs"/>
+              </a:defRPr>
+            </a:lvl7pPr>
+            <a:lvl8pPr marL="2571750" indent="-171450" algn="l" defTabSz="685800" rtl="0" eaLnBrk="1" latinLnBrk="0" hangingPunct="1">
+              <a:lnSpc>
+                <a:spcPct val="90000"/>
+              </a:lnSpc>
+              <a:spcBef>
+                <a:spcPts val="375"/>
+              </a:spcBef>
+              <a:buFont typeface="Arial" panose="020B0604020202020204" pitchFamily="34" charset="0"/>
+              <a:buChar char="•"/>
+              <a:defRPr sz="1350" kern="1200">
+                <a:solidFill>
+                  <a:schemeClr val="tx1"/>
+                </a:solidFill>
+                <a:latin typeface="+mn-lt"/>
+                <a:ea typeface="+mn-ea"/>
+                <a:cs typeface="+mn-cs"/>
+              </a:defRPr>
+            </a:lvl8pPr>
+            <a:lvl9pPr marL="2914650" indent="-171450" algn="l" defTabSz="685800" rtl="0" eaLnBrk="1" latinLnBrk="0" hangingPunct="1">
+              <a:lnSpc>
+                <a:spcPct val="90000"/>
+              </a:lnSpc>
+              <a:spcBef>
+                <a:spcPts val="375"/>
+              </a:spcBef>
+              <a:buFont typeface="Arial" panose="020B0604020202020204" pitchFamily="34" charset="0"/>
+              <a:buChar char="•"/>
+              <a:defRPr sz="1350" kern="1200">
+                <a:solidFill>
+                  <a:schemeClr val="tx1"/>
+                </a:solidFill>
+                <a:latin typeface="+mn-lt"/>
+                <a:ea typeface="+mn-ea"/>
+                <a:cs typeface="+mn-cs"/>
+              </a:defRPr>
+            </a:lvl9pPr>
+          </a:lstStyle>
+          <a:p>
+            <a:pPr marL="0" indent="0">
+              <a:buFont typeface="Arial" panose="020B0604020202020204" pitchFamily="34" charset="0"/>
+              <a:buNone/>
+            </a:pPr>
+            <a:r>
+              <a:rPr lang="en-US" sz="1600" b="1" dirty="0" err="1"/>
+              <a:t>Rezultati</a:t>
+            </a:r>
+            <a:r>
+              <a:rPr lang="en-US" sz="1600" b="1" dirty="0"/>
+              <a:t>/</a:t>
+            </a:r>
+            <a:r>
+              <a:rPr lang="en-US" sz="1600" b="1" dirty="0" err="1"/>
+              <a:t>dosedanje</a:t>
+            </a:r>
+            <a:r>
+              <a:rPr lang="en-US" sz="1600" b="1" dirty="0"/>
+              <a:t> </a:t>
+            </a:r>
+            <a:r>
+              <a:rPr lang="en-US" sz="1600" b="1" dirty="0" err="1"/>
+              <a:t>ugotovitve</a:t>
+            </a:r>
+            <a:r>
+              <a:rPr lang="en-US" sz="1600" b="1" dirty="0"/>
+              <a:t>/</a:t>
+            </a:r>
+            <a:r>
+              <a:rPr lang="en-US" sz="1600" b="1" dirty="0" err="1"/>
+              <a:t>odprta</a:t>
+            </a:r>
+            <a:r>
+              <a:rPr lang="en-US" sz="1600" b="1" dirty="0"/>
+              <a:t> </a:t>
+            </a:r>
+            <a:r>
+              <a:rPr lang="en-US" sz="1600" b="1" dirty="0" err="1"/>
+              <a:t>vprašanja</a:t>
+            </a:r>
+            <a:endParaRPr lang="en-US" sz="1600" b="1" dirty="0"/>
+          </a:p>
+        </p:txBody>
+      </p:sp>
+      <p:sp>
+        <p:nvSpPr>
+          <p:cNvPr id="12" name="Date Placeholder 11">
+            <a:extLst>
+              <a:ext uri="{FF2B5EF4-FFF2-40B4-BE49-F238E27FC236}">
+                <a16:creationId xmlns:a16="http://schemas.microsoft.com/office/drawing/2014/main" id="{482387C3-9A8A-9A47-8F63-FDB8F168E7F2}"/>
+              </a:ext>
+            </a:extLst>
+          </p:cNvPr>
+          <p:cNvSpPr>
+            <a:spLocks noGrp="1"/>
+          </p:cNvSpPr>
+          <p:nvPr>
+            <p:ph type="dt" sz="half" idx="10"/>
+          </p:nvPr>
+        </p:nvSpPr>
+        <p:spPr>
+          <a:xfrm>
+            <a:off x="76857" y="4800600"/>
+            <a:ext cx="3754164" cy="273844"/>
+          </a:xfrm>
+        </p:spPr>
+        <p:txBody>
+          <a:bodyPr/>
+          <a:lstStyle/>
+          <a:p>
+            <a:r>
+              <a:rPr lang="en-US" dirty="0"/>
+              <a:t>18. 4. 2024</a:t>
+            </a:r>
+          </a:p>
+        </p:txBody>
+      </p:sp>
+      <p:sp>
+        <p:nvSpPr>
+          <p:cNvPr id="13" name="Footer Placeholder 12">
+            <a:extLst>
+              <a:ext uri="{FF2B5EF4-FFF2-40B4-BE49-F238E27FC236}">
+                <a16:creationId xmlns:a16="http://schemas.microsoft.com/office/drawing/2014/main" id="{ED533418-37C8-B143-91FA-663B1D494022}"/>
+              </a:ext>
+            </a:extLst>
+          </p:cNvPr>
+          <p:cNvSpPr>
+            <a:spLocks noGrp="1"/>
+          </p:cNvSpPr>
+          <p:nvPr>
+            <p:ph type="ftr" sz="quarter" idx="11"/>
+          </p:nvPr>
+        </p:nvSpPr>
+        <p:spPr>
+          <a:xfrm>
+            <a:off x="3028950" y="4767263"/>
+            <a:ext cx="3086100" cy="273844"/>
+          </a:xfrm>
+        </p:spPr>
+        <p:txBody>
+          <a:bodyPr/>
+          <a:lstStyle/>
+          <a:p>
+            <a:r>
+              <a:rPr lang="en-US" dirty="0"/>
+              <a:t>PR23-24, </a:t>
+            </a:r>
+            <a:r>
+              <a:rPr lang="en-US" dirty="0" err="1"/>
+              <a:t>Vmesna</a:t>
+            </a:r>
+            <a:r>
+              <a:rPr lang="en-US" dirty="0"/>
+              <a:t> </a:t>
+            </a:r>
+            <a:r>
+              <a:rPr lang="en-US" dirty="0" err="1"/>
+              <a:t>predstavitev</a:t>
+            </a:r>
+            <a:endParaRPr lang="en-US" dirty="0"/>
+          </a:p>
+        </p:txBody>
+      </p:sp>
+    </p:spTree>
+    <p:extLst>
+      <p:ext uri="{BB962C8B-B14F-4D97-AF65-F5344CB8AC3E}">
+        <p14:creationId xmlns:p14="http://schemas.microsoft.com/office/powerpoint/2010/main" val="296469910"/>
+      </p:ext>
+    </p:extLst>
+  </p:cSld>
+  <p:clrMapOvr>
+    <a:masterClrMapping/>
+  </p:clrMapOvr>
+</p:sld>
+</file>
+
+<file path=ppt/slides/slide4.xml><?xml version="1.0" encoding="utf-8"?>
+<p:sld xmlns:a="http://schemas.openxmlformats.org/drawingml/2006/main" xmlns:r="http://schemas.openxmlformats.org/officeDocument/2006/relationships" xmlns:p="http://schemas.openxmlformats.org/presentationml/2006/main">
+  <p:cSld>
+    <p:spTree>
+      <p:nvGrpSpPr>
+        <p:cNvPr id="1" name=""/>
+        <p:cNvGrpSpPr/>
+        <p:nvPr/>
+      </p:nvGrpSpPr>
+      <p:grpSpPr>
+        <a:xfrm>
+          <a:off x="0" y="0"/>
+          <a:ext cx="0" cy="0"/>
+          <a:chOff x="0" y="0"/>
+          <a:chExt cx="0" cy="0"/>
+        </a:xfrm>
+      </p:grpSpPr>
+      <p:sp>
+        <p:nvSpPr>
           <p:cNvPr id="2" name="Title 1">
             <a:extLst>
               <a:ext uri="{FF2B5EF4-FFF2-40B4-BE49-F238E27FC236}">
@@ -5502,6 +6622,22 @@
           </a:bodyPr>
           <a:lstStyle/>
           <a:p>
+            <a:endParaRPr lang="sl-SI" sz="1600" dirty="0"/>
+          </a:p>
+          <a:p>
+            <a:r>
+              <a:rPr lang="sl-SI" sz="1600" dirty="0"/>
+              <a:t>Kakšen bo trend v prihodnosti? Ali se bo davek na človeška življenja zmanjšal ali inovacija vedno za sabo prinese posledice?</a:t>
+            </a:r>
+          </a:p>
+          <a:p>
+            <a:endParaRPr lang="sl-SI" sz="1600" dirty="0"/>
+          </a:p>
+          <a:p>
+            <a:r>
+              <a:rPr lang="sl-SI" sz="1600" dirty="0"/>
+              <a:t>Preučevanje vzrokov nesreč</a:t>
+            </a:r>
             <a:endParaRPr lang="en-US" sz="1600" dirty="0"/>
           </a:p>
         </p:txBody>
@@ -5529,7 +6665,7 @@
           <a:p>
             <a:fld id="{03BC8BC1-971C-5C4D-898D-87CE7EF1EB36}" type="slidenum">
               <a:rPr lang="en-US" smtClean="0"/>
-              <a:t>3</a:t>
+              <a:t>4</a:t>
             </a:fld>
             <a:endParaRPr lang="en-US"/>
           </a:p>

</xml_diff>